<commit_message>
updating labs 7 and 8 with Susans edits, moving lesson5 code into the right directory to avoid breaking existing links, modifying lesson ppts to reflect correct lesson number
</commit_message>
<xml_diff>
--- a/Complimentary Course Content/Module2/Lessons/Module2_Lesson8 Deploying Node.js Web Applications to Azure.pptx
+++ b/Complimentary Course Content/Module2/Lessons/Module2_Lesson8 Deploying Node.js Web Applications to Azure.pptx
@@ -716,7 +716,11 @@
             </a:pPr>
             <a:r>
               <a:rPr lang="en-US" b="0" baseline="0" dirty="0" smtClean="0"/>
-              <a:t>This file can be found in Module 2/Lesson7/hello-world/</a:t>
+              <a:t>This file can be found in Module </a:t>
+            </a:r>
+            <a:r>
+              <a:rPr lang="en-US" b="0" baseline="0" dirty="0" smtClean="0"/>
+              <a:t>2/Lesson8/hello-world/</a:t>
             </a:r>
             <a:r>
               <a:rPr lang="en-US" b="0" baseline="0" dirty="0" err="1" smtClean="0"/>
@@ -856,11 +860,15 @@
             </a:r>
             <a:r>
               <a:rPr lang="en-US" b="0" baseline="0" dirty="0" smtClean="0"/>
-              <a:t> file can be found in Module 2/</a:t>
+              <a:t> file can be found in Module </a:t>
+            </a:r>
+            <a:r>
+              <a:rPr lang="en-US" b="0" baseline="0" dirty="0" smtClean="0"/>
+              <a:t>2/</a:t>
             </a:r>
             <a:r>
               <a:rPr lang="en-US" dirty="0" smtClean="0"/>
-              <a:t>lesson7/hello-world/</a:t>
+              <a:t>lesson8/hello-world/</a:t>
             </a:r>
             <a:r>
               <a:rPr lang="en-US" dirty="0" err="1" smtClean="0"/>
@@ -895,7 +903,7 @@
             </a:r>
             <a:r>
               <a:rPr lang="en-US" b="0" dirty="0" err="1" smtClean="0"/>
-              <a:t>evn</a:t>
+              <a:t>env</a:t>
             </a:r>
             <a:r>
               <a:rPr lang="en-US" b="0" dirty="0" smtClean="0"/>
@@ -2958,7 +2966,7 @@
             </a:pPr>
             <a:r>
               <a:rPr lang="en-US" baseline="0" dirty="0" smtClean="0"/>
-              <a:t>lesson7/</a:t>
+              <a:t>lesson8/</a:t>
             </a:r>
             <a:r>
               <a:rPr lang="en-US" baseline="0" dirty="0" err="1" smtClean="0"/>
@@ -3177,7 +3185,7 @@
             </a:pPr>
             <a:r>
               <a:rPr lang="en-US" baseline="0" dirty="0" smtClean="0"/>
-              <a:t>lesson7/</a:t>
+              <a:t>lesson8/</a:t>
             </a:r>
             <a:r>
               <a:rPr lang="en-US" baseline="0" dirty="0" err="1" smtClean="0"/>
@@ -3406,7 +3414,7 @@
             </a:r>
             <a:r>
               <a:rPr lang="en-US" b="0" baseline="0" dirty="0" smtClean="0"/>
-              <a:t> Module 2 Lesson 7 Lab should be competed at this time</a:t>
+              <a:t> Module 2 Lesson 8 Lab should be competed at this time</a:t>
             </a:r>
           </a:p>
           <a:p>
@@ -3440,7 +3448,7 @@
             </a:r>
             <a:r>
               <a:rPr lang="en-US" b="0" baseline="0" smtClean="0"/>
-              <a:t>/blob/master/Complimentary%20Course%20Content/Module2/Labs/Module%202%20Lesson%207%20Lab.docx</a:t>
+              <a:t>/blob/master/Complimentary%20Course%20Content/Module2/Labs/Module%202%20Lesson%208%20Lab.docx</a:t>
             </a:r>
             <a:endParaRPr lang="en-US" dirty="0"/>
           </a:p>
@@ -50454,15 +50462,15 @@
           <a:p>
             <a:r>
               <a:rPr lang="en-US" sz="2000" dirty="0"/>
-              <a:t>azure site create --</a:t>
-            </a:r>
-            <a:r>
-              <a:rPr lang="en-US" sz="2000" dirty="0" err="1"/>
-              <a:t>git</a:t>
+              <a:t>azure site </a:t>
+            </a:r>
+            <a:r>
+              <a:rPr lang="en-US" sz="2000" dirty="0" smtClean="0"/>
+              <a:t>create </a:t>
             </a:r>
             <a:r>
               <a:rPr lang="en-US" sz="2000" dirty="0"/>
-              <a:t> {</a:t>
+              <a:t>{</a:t>
             </a:r>
             <a:r>
               <a:rPr lang="en-US" sz="2000" dirty="0" err="1"/>
@@ -50470,7 +50478,11 @@
             </a:r>
             <a:r>
               <a:rPr lang="en-US" sz="2000" dirty="0" smtClean="0"/>
-              <a:t>}</a:t>
+              <a:t>} --</a:t>
+            </a:r>
+            <a:r>
+              <a:rPr lang="en-US" sz="2000" dirty="0" err="1" smtClean="0"/>
+              <a:t>git</a:t>
             </a:r>
             <a:endParaRPr lang="en-US" sz="2000" dirty="0"/>
           </a:p>
@@ -50619,20 +50631,17 @@
             </a:r>
             <a:r>
               <a:rPr lang="en-US" sz="1800" dirty="0"/>
-              <a:t>site create --</a:t>
-            </a:r>
-            <a:r>
-              <a:rPr lang="en-US" sz="1800" dirty="0" err="1"/>
+              <a:t>site </a:t>
+            </a:r>
+            <a:r>
+              <a:rPr lang="en-US" sz="1800" dirty="0" smtClean="0"/>
+              <a:t>create hellojs2 --</a:t>
+            </a:r>
+            <a:r>
+              <a:rPr lang="en-US" sz="1800" dirty="0" err="1" smtClean="0"/>
               <a:t>git</a:t>
             </a:r>
-            <a:r>
-              <a:rPr lang="en-US" sz="1800" dirty="0"/>
-              <a:t> </a:t>
-            </a:r>
-            <a:r>
-              <a:rPr lang="en-US" sz="1800" dirty="0" smtClean="0"/>
-              <a:t>hellojs2</a:t>
-            </a:r>
+            <a:endParaRPr lang="en-US" sz="1800" dirty="0" smtClean="0"/>
           </a:p>
           <a:p>
             <a:pPr>
@@ -53435,18 +53444,10 @@
                     <a:srgbClr val="FFFFFF"/>
                   </a:solidFill>
                 </a:rPr>
-                <a:t> and explain </a:t>
+                <a:t> and explain that </a:t>
               </a:r>
               <a:r>
-                <a:rPr lang="en-US" sz="2800">
-                  <a:solidFill>
-                    <a:srgbClr val="FFFFFF"/>
-                  </a:solidFill>
-                </a:rPr>
-                <a:t>that </a:t>
-              </a:r>
-              <a:r>
-                <a:rPr lang="en-US" sz="2800" smtClean="0">
+                <a:rPr lang="en-US" sz="2800" dirty="0" smtClean="0">
                   <a:solidFill>
                     <a:srgbClr val="FFFFFF"/>
                   </a:solidFill>
@@ -53481,7 +53482,7 @@
                     <a:srgbClr val="FFFFFF"/>
                   </a:solidFill>
                 </a:rPr>
-                <a:t>lesson7/</a:t>
+                <a:t>lesson8/</a:t>
               </a:r>
               <a:r>
                 <a:rPr lang="en-US" sz="2800" dirty="0" err="1" smtClean="0">

</xml_diff>

<commit_message>
updating Module2 lesson8 ppt to fix hello world directory
</commit_message>
<xml_diff>
--- a/Complimentary Course Content/Module2/Lessons/Module2_Lesson8 Deploying Node.js Web Applications to Azure.pptx
+++ b/Complimentary Course Content/Module2/Lessons/Module2_Lesson8 Deploying Node.js Web Applications to Azure.pptx
@@ -293,7 +293,7 @@
             <a:fld id="{2E5CA586-3557-4985-BCD4-35EF5AC8B4A4}" type="datetimeFigureOut">
               <a:rPr lang="en-US" smtClean="0"/>
               <a:pPr/>
-              <a:t>12/20/16</a:t>
+              <a:t>12/29/16</a:t>
             </a:fld>
             <a:endParaRPr lang="en-US"/>
           </a:p>
@@ -720,7 +720,33 @@
             </a:r>
             <a:r>
               <a:rPr lang="en-US" b="0" baseline="0" dirty="0" smtClean="0"/>
-              <a:t>2/Lesson8/hello-world/</a:t>
+              <a:t>2/code/lesson8/</a:t>
+            </a:r>
+            <a:r>
+              <a:rPr lang="en-US" sz="1200" kern="1200" dirty="0" err="1" smtClean="0">
+                <a:solidFill>
+                  <a:schemeClr val="tx1"/>
+                </a:solidFill>
+                <a:latin typeface="+mn-lt"/>
+                <a:ea typeface="+mn-ea"/>
+                <a:cs typeface="+mn-cs"/>
+              </a:rPr>
+              <a:t>nodejs</a:t>
+            </a:r>
+            <a:r>
+              <a:rPr lang="en-US" sz="1200" kern="1200" dirty="0" smtClean="0">
+                <a:solidFill>
+                  <a:schemeClr val="tx1"/>
+                </a:solidFill>
+                <a:latin typeface="+mn-lt"/>
+                <a:ea typeface="+mn-ea"/>
+                <a:cs typeface="+mn-cs"/>
+              </a:rPr>
+              <a:t>-express-hello-world-app</a:t>
+            </a:r>
+            <a:r>
+              <a:rPr lang="en-US" b="0" baseline="0" dirty="0" smtClean="0"/>
+              <a:t>/</a:t>
             </a:r>
             <a:r>
               <a:rPr lang="en-US" b="0" baseline="0" dirty="0" err="1" smtClean="0"/>
@@ -864,11 +890,37 @@
             </a:r>
             <a:r>
               <a:rPr lang="en-US" b="0" baseline="0" dirty="0" smtClean="0"/>
-              <a:t>2/</a:t>
+              <a:t>2/code/l</a:t>
             </a:r>
             <a:r>
               <a:rPr lang="en-US" dirty="0" smtClean="0"/>
-              <a:t>lesson8/hello-world/</a:t>
+              <a:t>esson8/</a:t>
+            </a:r>
+            <a:r>
+              <a:rPr lang="en-US" sz="1200" kern="1200" dirty="0" err="1" smtClean="0">
+                <a:solidFill>
+                  <a:schemeClr val="tx1"/>
+                </a:solidFill>
+                <a:latin typeface="+mn-lt"/>
+                <a:ea typeface="+mn-ea"/>
+                <a:cs typeface="+mn-cs"/>
+              </a:rPr>
+              <a:t>nodejs</a:t>
+            </a:r>
+            <a:r>
+              <a:rPr lang="en-US" sz="1200" kern="1200" dirty="0" smtClean="0">
+                <a:solidFill>
+                  <a:schemeClr val="tx1"/>
+                </a:solidFill>
+                <a:latin typeface="+mn-lt"/>
+                <a:ea typeface="+mn-ea"/>
+                <a:cs typeface="+mn-cs"/>
+              </a:rPr>
+              <a:t>-express-hello-world-app</a:t>
+            </a:r>
+            <a:r>
+              <a:rPr lang="en-US" dirty="0" smtClean="0"/>
+              <a:t>/</a:t>
             </a:r>
             <a:r>
               <a:rPr lang="en-US" dirty="0" err="1" smtClean="0"/>
@@ -7143,7 +7195,7 @@
             </a:ln>
             <a:extLst>
               <a:ext uri="{91240B29-F687-4f45-9708-019B960494DF}">
-                <a14:hiddenLine xmlns:a14="http://schemas.microsoft.com/office/drawing/2010/main" xmlns="" w="9525">
+                <a14:hiddenLine xmlns="" xmlns:a14="http://schemas.microsoft.com/office/drawing/2010/main" w="9525">
                   <a:solidFill>
                     <a:srgbClr val="000000"/>
                   </a:solidFill>
@@ -7195,7 +7247,7 @@
             </a:ln>
             <a:extLst>
               <a:ext uri="{91240B29-F687-4f45-9708-019B960494DF}">
-                <a14:hiddenLine xmlns:a14="http://schemas.microsoft.com/office/drawing/2010/main" xmlns="" w="9525">
+                <a14:hiddenLine xmlns="" xmlns:a14="http://schemas.microsoft.com/office/drawing/2010/main" w="9525">
                   <a:solidFill>
                     <a:srgbClr val="000000"/>
                   </a:solidFill>
@@ -7247,7 +7299,7 @@
             </a:ln>
             <a:extLst>
               <a:ext uri="{91240B29-F687-4f45-9708-019B960494DF}">
-                <a14:hiddenLine xmlns:a14="http://schemas.microsoft.com/office/drawing/2010/main" xmlns="" w="9525">
+                <a14:hiddenLine xmlns="" xmlns:a14="http://schemas.microsoft.com/office/drawing/2010/main" w="9525">
                   <a:solidFill>
                     <a:srgbClr val="000000"/>
                   </a:solidFill>
@@ -7299,7 +7351,7 @@
             </a:ln>
             <a:extLst>
               <a:ext uri="{91240B29-F687-4f45-9708-019B960494DF}">
-                <a14:hiddenLine xmlns:a14="http://schemas.microsoft.com/office/drawing/2010/main" xmlns="" w="9525">
+                <a14:hiddenLine xmlns="" xmlns:a14="http://schemas.microsoft.com/office/drawing/2010/main" w="9525">
                   <a:solidFill>
                     <a:srgbClr val="000000"/>
                   </a:solidFill>
@@ -7351,7 +7403,7 @@
             </a:ln>
             <a:extLst>
               <a:ext uri="{91240B29-F687-4f45-9708-019B960494DF}">
-                <a14:hiddenLine xmlns:a14="http://schemas.microsoft.com/office/drawing/2010/main" xmlns="" w="9525">
+                <a14:hiddenLine xmlns="" xmlns:a14="http://schemas.microsoft.com/office/drawing/2010/main" w="9525">
                   <a:solidFill>
                     <a:srgbClr val="000000"/>
                   </a:solidFill>
@@ -9056,7 +9108,7 @@
                 <a:latin typeface="Segoe UI"/>
               </a:rPr>
               <a:pPr/>
-              <a:t>12/20/16</a:t>
+              <a:t>12/29/16</a:t>
             </a:fld>
             <a:endParaRPr lang="en-US">
               <a:solidFill>
@@ -9859,7 +9911,7 @@
           </a:ln>
           <a:extLst>
             <a:ext uri="{91240B29-F687-4f45-9708-019B960494DF}">
-              <a14:hiddenLine xmlns:a14="http://schemas.microsoft.com/office/drawing/2010/main" xmlns="" w="9525">
+              <a14:hiddenLine xmlns="" xmlns:a14="http://schemas.microsoft.com/office/drawing/2010/main" w="9525">
                 <a:solidFill>
                   <a:srgbClr val="000000"/>
                 </a:solidFill>
@@ -12434,7 +12486,7 @@
             </a:ln>
             <a:extLst>
               <a:ext uri="{91240B29-F687-4f45-9708-019B960494DF}">
-                <a14:hiddenLine xmlns:a14="http://schemas.microsoft.com/office/drawing/2010/main" xmlns="" w="9525">
+                <a14:hiddenLine xmlns="" xmlns:a14="http://schemas.microsoft.com/office/drawing/2010/main" w="9525">
                   <a:solidFill>
                     <a:srgbClr val="000000"/>
                   </a:solidFill>
@@ -13013,7 +13065,7 @@
             </a:ln>
             <a:extLst>
               <a:ext uri="{91240B29-F687-4f45-9708-019B960494DF}">
-                <a14:hiddenLine xmlns:a14="http://schemas.microsoft.com/office/drawing/2010/main" xmlns="" w="9525">
+                <a14:hiddenLine xmlns="" xmlns:a14="http://schemas.microsoft.com/office/drawing/2010/main" w="9525">
                   <a:solidFill>
                     <a:srgbClr val="000000"/>
                   </a:solidFill>
@@ -14455,7 +14507,7 @@
             </a:ln>
             <a:extLst>
               <a:ext uri="{91240B29-F687-4f45-9708-019B960494DF}">
-                <a14:hiddenLine xmlns:a14="http://schemas.microsoft.com/office/drawing/2010/main" xmlns="" w="9525">
+                <a14:hiddenLine xmlns="" xmlns:a14="http://schemas.microsoft.com/office/drawing/2010/main" w="9525">
                   <a:solidFill>
                     <a:srgbClr val="000000"/>
                   </a:solidFill>
@@ -14506,7 +14558,7 @@
             </a:ln>
             <a:extLst>
               <a:ext uri="{91240B29-F687-4f45-9708-019B960494DF}">
-                <a14:hiddenLine xmlns:a14="http://schemas.microsoft.com/office/drawing/2010/main" xmlns="" w="9525">
+                <a14:hiddenLine xmlns="" xmlns:a14="http://schemas.microsoft.com/office/drawing/2010/main" w="9525">
                   <a:solidFill>
                     <a:srgbClr val="000000"/>
                   </a:solidFill>
@@ -14557,7 +14609,7 @@
             </a:ln>
             <a:extLst>
               <a:ext uri="{91240B29-F687-4f45-9708-019B960494DF}">
-                <a14:hiddenLine xmlns:a14="http://schemas.microsoft.com/office/drawing/2010/main" xmlns="" w="9525">
+                <a14:hiddenLine xmlns="" xmlns:a14="http://schemas.microsoft.com/office/drawing/2010/main" w="9525">
                   <a:solidFill>
                     <a:srgbClr val="000000"/>
                   </a:solidFill>
@@ -14608,7 +14660,7 @@
             </a:ln>
             <a:extLst>
               <a:ext uri="{91240B29-F687-4f45-9708-019B960494DF}">
-                <a14:hiddenLine xmlns:a14="http://schemas.microsoft.com/office/drawing/2010/main" xmlns="" w="9525">
+                <a14:hiddenLine xmlns="" xmlns:a14="http://schemas.microsoft.com/office/drawing/2010/main" w="9525">
                   <a:solidFill>
                     <a:srgbClr val="000000"/>
                   </a:solidFill>
@@ -14659,7 +14711,7 @@
             </a:ln>
             <a:extLst>
               <a:ext uri="{91240B29-F687-4f45-9708-019B960494DF}">
-                <a14:hiddenLine xmlns:a14="http://schemas.microsoft.com/office/drawing/2010/main" xmlns="" w="9525">
+                <a14:hiddenLine xmlns="" xmlns:a14="http://schemas.microsoft.com/office/drawing/2010/main" w="9525">
                   <a:solidFill>
                     <a:srgbClr val="000000"/>
                   </a:solidFill>
@@ -20446,7 +20498,7 @@
           </a:ln>
           <a:extLst>
             <a:ext uri="{91240B29-F687-4f45-9708-019B960494DF}">
-              <a14:hiddenLine xmlns:a14="http://schemas.microsoft.com/office/drawing/2010/main" xmlns="" w="9525">
+              <a14:hiddenLine xmlns="" xmlns:a14="http://schemas.microsoft.com/office/drawing/2010/main" w="9525">
                 <a:solidFill>
                   <a:srgbClr val="000000"/>
                 </a:solidFill>
@@ -23021,7 +23073,7 @@
             </a:ln>
             <a:extLst>
               <a:ext uri="{91240B29-F687-4f45-9708-019B960494DF}">
-                <a14:hiddenLine xmlns:a14="http://schemas.microsoft.com/office/drawing/2010/main" xmlns="" w="9525">
+                <a14:hiddenLine xmlns="" xmlns:a14="http://schemas.microsoft.com/office/drawing/2010/main" w="9525">
                   <a:solidFill>
                     <a:srgbClr val="000000"/>
                   </a:solidFill>
@@ -23600,7 +23652,7 @@
             </a:ln>
             <a:extLst>
               <a:ext uri="{91240B29-F687-4f45-9708-019B960494DF}">
-                <a14:hiddenLine xmlns:a14="http://schemas.microsoft.com/office/drawing/2010/main" xmlns="" w="9525">
+                <a14:hiddenLine xmlns="" xmlns:a14="http://schemas.microsoft.com/office/drawing/2010/main" w="9525">
                   <a:solidFill>
                     <a:srgbClr val="000000"/>
                   </a:solidFill>
@@ -25042,7 +25094,7 @@
             </a:ln>
             <a:extLst>
               <a:ext uri="{91240B29-F687-4f45-9708-019B960494DF}">
-                <a14:hiddenLine xmlns:a14="http://schemas.microsoft.com/office/drawing/2010/main" xmlns="" w="9525">
+                <a14:hiddenLine xmlns="" xmlns:a14="http://schemas.microsoft.com/office/drawing/2010/main" w="9525">
                   <a:solidFill>
                     <a:srgbClr val="000000"/>
                   </a:solidFill>
@@ -25093,7 +25145,7 @@
             </a:ln>
             <a:extLst>
               <a:ext uri="{91240B29-F687-4f45-9708-019B960494DF}">
-                <a14:hiddenLine xmlns:a14="http://schemas.microsoft.com/office/drawing/2010/main" xmlns="" w="9525">
+                <a14:hiddenLine xmlns="" xmlns:a14="http://schemas.microsoft.com/office/drawing/2010/main" w="9525">
                   <a:solidFill>
                     <a:srgbClr val="000000"/>
                   </a:solidFill>
@@ -25144,7 +25196,7 @@
             </a:ln>
             <a:extLst>
               <a:ext uri="{91240B29-F687-4f45-9708-019B960494DF}">
-                <a14:hiddenLine xmlns:a14="http://schemas.microsoft.com/office/drawing/2010/main" xmlns="" w="9525">
+                <a14:hiddenLine xmlns="" xmlns:a14="http://schemas.microsoft.com/office/drawing/2010/main" w="9525">
                   <a:solidFill>
                     <a:srgbClr val="000000"/>
                   </a:solidFill>
@@ -25195,7 +25247,7 @@
             </a:ln>
             <a:extLst>
               <a:ext uri="{91240B29-F687-4f45-9708-019B960494DF}">
-                <a14:hiddenLine xmlns:a14="http://schemas.microsoft.com/office/drawing/2010/main" xmlns="" w="9525">
+                <a14:hiddenLine xmlns="" xmlns:a14="http://schemas.microsoft.com/office/drawing/2010/main" w="9525">
                   <a:solidFill>
                     <a:srgbClr val="000000"/>
                   </a:solidFill>
@@ -25246,7 +25298,7 @@
             </a:ln>
             <a:extLst>
               <a:ext uri="{91240B29-F687-4f45-9708-019B960494DF}">
-                <a14:hiddenLine xmlns:a14="http://schemas.microsoft.com/office/drawing/2010/main" xmlns="" w="9525">
+                <a14:hiddenLine xmlns="" xmlns:a14="http://schemas.microsoft.com/office/drawing/2010/main" w="9525">
                   <a:solidFill>
                     <a:srgbClr val="000000"/>
                   </a:solidFill>
@@ -27423,7 +27475,7 @@
                 <a:latin typeface="Segoe UI"/>
               </a:rPr>
               <a:pPr/>
-              <a:t>12/20/16</a:t>
+              <a:t>12/29/16</a:t>
             </a:fld>
             <a:endParaRPr lang="en-US">
               <a:solidFill>
@@ -27628,7 +27680,7 @@
                 <a:latin typeface="Segoe UI"/>
               </a:rPr>
               <a:pPr/>
-              <a:t>12/20/16</a:t>
+              <a:t>12/29/16</a:t>
             </a:fld>
             <a:endParaRPr lang="en-US">
               <a:solidFill>
@@ -27926,7 +27978,7 @@
                 <a:latin typeface="Segoe UI"/>
               </a:rPr>
               <a:pPr/>
-              <a:t>12/20/16</a:t>
+              <a:t>12/29/16</a:t>
             </a:fld>
             <a:endParaRPr lang="en-US">
               <a:solidFill>
@@ -28270,7 +28322,7 @@
                 <a:latin typeface="Segoe UI"/>
               </a:rPr>
               <a:pPr/>
-              <a:t>12/20/16</a:t>
+              <a:t>12/29/16</a:t>
             </a:fld>
             <a:endParaRPr lang="en-US">
               <a:solidFill>
@@ -28645,7 +28697,7 @@
                 <a:latin typeface="Segoe UI"/>
               </a:rPr>
               <a:pPr/>
-              <a:t>12/20/16</a:t>
+              <a:t>12/29/16</a:t>
             </a:fld>
             <a:endParaRPr lang="en-US">
               <a:solidFill>
@@ -30152,7 +30204,7 @@
                 <a:latin typeface="Segoe UI"/>
               </a:rPr>
               <a:pPr/>
-              <a:t>12/20/16</a:t>
+              <a:t>12/29/16</a:t>
             </a:fld>
             <a:endParaRPr lang="en-US">
               <a:solidFill>
@@ -30553,7 +30605,7 @@
                 <a:latin typeface="Segoe UI"/>
               </a:rPr>
               <a:pPr/>
-              <a:t>12/20/16</a:t>
+              <a:t>12/29/16</a:t>
             </a:fld>
             <a:endParaRPr lang="en-US">
               <a:solidFill>
@@ -30707,7 +30759,7 @@
                 <a:latin typeface="Segoe UI"/>
               </a:rPr>
               <a:pPr/>
-              <a:t>12/20/16</a:t>
+              <a:t>12/29/16</a:t>
             </a:fld>
             <a:endParaRPr lang="en-US">
               <a:solidFill>
@@ -30839,7 +30891,7 @@
                 <a:latin typeface="Segoe UI"/>
               </a:rPr>
               <a:pPr/>
-              <a:t>12/20/16</a:t>
+              <a:t>12/29/16</a:t>
             </a:fld>
             <a:endParaRPr lang="en-US">
               <a:solidFill>
@@ -31151,7 +31203,7 @@
                 <a:latin typeface="Segoe UI"/>
               </a:rPr>
               <a:pPr/>
-              <a:t>12/20/16</a:t>
+              <a:t>12/29/16</a:t>
             </a:fld>
             <a:endParaRPr lang="en-US">
               <a:solidFill>
@@ -31440,7 +31492,7 @@
                 <a:latin typeface="Segoe UI"/>
               </a:rPr>
               <a:pPr/>
-              <a:t>12/20/16</a:t>
+              <a:t>12/29/16</a:t>
             </a:fld>
             <a:endParaRPr lang="en-US">
               <a:solidFill>
@@ -31645,7 +31697,7 @@
                 <a:latin typeface="Segoe UI"/>
               </a:rPr>
               <a:pPr/>
-              <a:t>12/20/16</a:t>
+              <a:t>12/29/16</a:t>
             </a:fld>
             <a:endParaRPr lang="en-US">
               <a:solidFill>
@@ -31860,7 +31912,7 @@
                 <a:latin typeface="Segoe UI"/>
               </a:rPr>
               <a:pPr/>
-              <a:t>12/20/16</a:t>
+              <a:t>12/29/16</a:t>
             </a:fld>
             <a:endParaRPr lang="en-US">
               <a:solidFill>
@@ -32105,7 +32157,7 @@
                 <a:latin typeface="Segoe UI"/>
               </a:rPr>
               <a:pPr/>
-              <a:t>12/20/16</a:t>
+              <a:t>12/29/16</a:t>
             </a:fld>
             <a:endParaRPr lang="en-US">
               <a:solidFill>
@@ -32412,7 +32464,7 @@
                 <a:latin typeface="Segoe UI"/>
               </a:rPr>
               <a:pPr/>
-              <a:t>12/20/16</a:t>
+              <a:t>12/29/16</a:t>
             </a:fld>
             <a:endParaRPr lang="en-US">
               <a:solidFill>
@@ -32712,7 +32764,7 @@
                 <a:latin typeface="Segoe UI"/>
               </a:rPr>
               <a:pPr/>
-              <a:t>12/20/16</a:t>
+              <a:t>12/29/16</a:t>
             </a:fld>
             <a:endParaRPr lang="en-US">
               <a:solidFill>
@@ -32986,7 +33038,7 @@
                 <a:latin typeface="Segoe UI"/>
               </a:rPr>
               <a:pPr/>
-              <a:t>12/20/16</a:t>
+              <a:t>12/29/16</a:t>
             </a:fld>
             <a:endParaRPr lang="en-US">
               <a:solidFill>
@@ -33387,7 +33439,7 @@
                 <a:latin typeface="Segoe UI"/>
               </a:rPr>
               <a:pPr/>
-              <a:t>12/20/16</a:t>
+              <a:t>12/29/16</a:t>
             </a:fld>
             <a:endParaRPr lang="en-US">
               <a:solidFill>
@@ -33541,7 +33593,7 @@
                 <a:latin typeface="Segoe UI"/>
               </a:rPr>
               <a:pPr/>
-              <a:t>12/20/16</a:t>
+              <a:t>12/29/16</a:t>
             </a:fld>
             <a:endParaRPr lang="en-US">
               <a:solidFill>
@@ -33673,7 +33725,7 @@
                 <a:latin typeface="Segoe UI"/>
               </a:rPr>
               <a:pPr/>
-              <a:t>12/20/16</a:t>
+              <a:t>12/29/16</a:t>
             </a:fld>
             <a:endParaRPr lang="en-US">
               <a:solidFill>
@@ -33985,7 +34037,7 @@
                 <a:latin typeface="Segoe UI"/>
               </a:rPr>
               <a:pPr/>
-              <a:t>12/20/16</a:t>
+              <a:t>12/29/16</a:t>
             </a:fld>
             <a:endParaRPr lang="en-US">
               <a:solidFill>
@@ -34274,7 +34326,7 @@
                 <a:latin typeface="Segoe UI"/>
               </a:rPr>
               <a:pPr/>
-              <a:t>12/20/16</a:t>
+              <a:t>12/29/16</a:t>
             </a:fld>
             <a:endParaRPr lang="en-US">
               <a:solidFill>
@@ -34479,7 +34531,7 @@
                 <a:latin typeface="Segoe UI"/>
               </a:rPr>
               <a:pPr/>
-              <a:t>12/20/16</a:t>
+              <a:t>12/29/16</a:t>
             </a:fld>
             <a:endParaRPr lang="en-US">
               <a:solidFill>
@@ -34694,7 +34746,7 @@
                 <a:latin typeface="Segoe UI"/>
               </a:rPr>
               <a:pPr/>
-              <a:t>12/20/16</a:t>
+              <a:t>12/29/16</a:t>
             </a:fld>
             <a:endParaRPr lang="en-US">
               <a:solidFill>
@@ -35009,7 +35061,7 @@
                 <a:latin typeface="Segoe UI"/>
               </a:rPr>
               <a:pPr/>
-              <a:t>12/20/16</a:t>
+              <a:t>12/29/16</a:t>
             </a:fld>
             <a:endParaRPr lang="en-US">
               <a:solidFill>
@@ -35214,7 +35266,7 @@
                 <a:latin typeface="Segoe UI"/>
               </a:rPr>
               <a:pPr/>
-              <a:t>12/20/16</a:t>
+              <a:t>12/29/16</a:t>
             </a:fld>
             <a:endParaRPr lang="en-US">
               <a:solidFill>
@@ -35512,7 +35564,7 @@
                 <a:latin typeface="Segoe UI"/>
               </a:rPr>
               <a:pPr/>
-              <a:t>12/20/16</a:t>
+              <a:t>12/29/16</a:t>
             </a:fld>
             <a:endParaRPr lang="en-US">
               <a:solidFill>
@@ -35856,7 +35908,7 @@
                 <a:latin typeface="Segoe UI"/>
               </a:rPr>
               <a:pPr/>
-              <a:t>12/20/16</a:t>
+              <a:t>12/29/16</a:t>
             </a:fld>
             <a:endParaRPr lang="en-US">
               <a:solidFill>
@@ -36231,7 +36283,7 @@
                 <a:latin typeface="Segoe UI"/>
               </a:rPr>
               <a:pPr/>
-              <a:t>12/20/16</a:t>
+              <a:t>12/29/16</a:t>
             </a:fld>
             <a:endParaRPr lang="en-US">
               <a:solidFill>
@@ -37175,7 +37227,7 @@
                 <a:latin typeface="Segoe UI"/>
               </a:rPr>
               <a:pPr/>
-              <a:t>12/20/16</a:t>
+              <a:t>12/29/16</a:t>
             </a:fld>
             <a:endParaRPr lang="en-US">
               <a:solidFill>
@@ -37576,7 +37628,7 @@
                 <a:latin typeface="Segoe UI"/>
               </a:rPr>
               <a:pPr/>
-              <a:t>12/20/16</a:t>
+              <a:t>12/29/16</a:t>
             </a:fld>
             <a:endParaRPr lang="en-US">
               <a:solidFill>
@@ -37763,7 +37815,7 @@
                 <a:latin typeface="Segoe UI"/>
               </a:rPr>
               <a:pPr/>
-              <a:t>12/20/16</a:t>
+              <a:t>12/29/16</a:t>
             </a:fld>
             <a:endParaRPr lang="en-US">
               <a:solidFill>
@@ -37895,7 +37947,7 @@
                 <a:latin typeface="Segoe UI"/>
               </a:rPr>
               <a:pPr/>
-              <a:t>12/20/16</a:t>
+              <a:t>12/29/16</a:t>
             </a:fld>
             <a:endParaRPr lang="en-US">
               <a:solidFill>
@@ -38207,7 +38259,7 @@
                 <a:latin typeface="Segoe UI"/>
               </a:rPr>
               <a:pPr/>
-              <a:t>12/20/16</a:t>
+              <a:t>12/29/16</a:t>
             </a:fld>
             <a:endParaRPr lang="en-US">
               <a:solidFill>
@@ -38496,7 +38548,7 @@
                 <a:latin typeface="Segoe UI"/>
               </a:rPr>
               <a:pPr/>
-              <a:t>12/20/16</a:t>
+              <a:t>12/29/16</a:t>
             </a:fld>
             <a:endParaRPr lang="en-US">
               <a:solidFill>
@@ -38701,7 +38753,7 @@
                 <a:latin typeface="Segoe UI"/>
               </a:rPr>
               <a:pPr/>
-              <a:t>12/20/16</a:t>
+              <a:t>12/29/16</a:t>
             </a:fld>
             <a:endParaRPr lang="en-US">
               <a:solidFill>
@@ -38916,7 +38968,7 @@
                 <a:latin typeface="Segoe UI"/>
               </a:rPr>
               <a:pPr/>
-              <a:t>12/20/16</a:t>
+              <a:t>12/29/16</a:t>
             </a:fld>
             <a:endParaRPr lang="en-US">
               <a:solidFill>
@@ -43301,7 +43353,7 @@
           </a:ln>
           <a:extLst>
             <a:ext uri="{91240B29-F687-4f45-9708-019B960494DF}">
-              <a14:hiddenLine xmlns:a14="http://schemas.microsoft.com/office/drawing/2010/main" xmlns="" w="9525">
+              <a14:hiddenLine xmlns="" xmlns:a14="http://schemas.microsoft.com/office/drawing/2010/main" w="9525">
                 <a:solidFill>
                   <a:srgbClr val="000000"/>
                 </a:solidFill>
@@ -45883,7 +45935,7 @@
             </a:ln>
             <a:extLst>
               <a:ext uri="{91240B29-F687-4f45-9708-019B960494DF}">
-                <a14:hiddenLine xmlns:a14="http://schemas.microsoft.com/office/drawing/2010/main" xmlns="" w="9525">
+                <a14:hiddenLine xmlns="" xmlns:a14="http://schemas.microsoft.com/office/drawing/2010/main" w="9525">
                   <a:solidFill>
                     <a:srgbClr val="000000"/>
                   </a:solidFill>
@@ -46463,7 +46515,7 @@
             </a:ln>
             <a:extLst>
               <a:ext uri="{91240B29-F687-4f45-9708-019B960494DF}">
-                <a14:hiddenLine xmlns:a14="http://schemas.microsoft.com/office/drawing/2010/main" xmlns="" w="9525">
+                <a14:hiddenLine xmlns="" xmlns:a14="http://schemas.microsoft.com/office/drawing/2010/main" w="9525">
                   <a:solidFill>
                     <a:srgbClr val="000000"/>
                   </a:solidFill>
@@ -47670,7 +47722,7 @@
                 <a:latin typeface="Segoe UI"/>
               </a:rPr>
               <a:pPr/>
-              <a:t>12/20/16</a:t>
+              <a:t>12/29/16</a:t>
             </a:fld>
             <a:endParaRPr lang="en-US">
               <a:solidFill>
@@ -48250,7 +48302,7 @@
                 <a:latin typeface="Segoe UI"/>
               </a:rPr>
               <a:pPr/>
-              <a:t>12/20/16</a:t>
+              <a:t>12/29/16</a:t>
             </a:fld>
             <a:endParaRPr lang="en-US">
               <a:solidFill>
@@ -48825,7 +48877,7 @@
                 <a:latin typeface="Segoe UI"/>
               </a:rPr>
               <a:pPr/>
-              <a:t>12/20/16</a:t>
+              <a:t>12/29/16</a:t>
             </a:fld>
             <a:endParaRPr lang="en-US">
               <a:solidFill>
@@ -49976,8 +50028,13 @@
             </a:pPr>
             <a:r>
               <a:rPr lang="en-US" sz="1800" dirty="0"/>
-              <a:t>  "name": "lesson7",</a:t>
-            </a:r>
+              <a:t>  "name": "</a:t>
+            </a:r>
+            <a:r>
+              <a:rPr lang="en-US" sz="1800" dirty="0" smtClean="0"/>
+              <a:t>lesson8",</a:t>
+            </a:r>
+            <a:endParaRPr lang="en-US" sz="1800" dirty="0"/>
           </a:p>
           <a:p>
             <a:pPr>
@@ -56469,14 +56526,26 @@
           <a:lstStyle/>
           <a:p>
             <a:r>
+              <a:rPr lang="en-US" sz="2000" dirty="0" smtClean="0"/>
+              <a:t>/</a:t>
+            </a:r>
+            <a:r>
+              <a:rPr lang="en-US" sz="2000" dirty="0" err="1" smtClean="0"/>
+              <a:t>nodejs</a:t>
+            </a:r>
+            <a:r>
+              <a:rPr lang="en-US" sz="2000" dirty="0" smtClean="0"/>
+              <a:t>-express-hello-world-app</a:t>
+            </a:r>
+          </a:p>
+          <a:p>
+            <a:r>
+              <a:rPr lang="en-US" sz="2000" dirty="0" smtClean="0"/>
+              <a:t>  </a:t>
+            </a:r>
+            <a:r>
               <a:rPr lang="en-US" sz="2000" dirty="0"/>
-              <a:t>/hello-world</a:t>
-            </a:r>
-          </a:p>
-          <a:p>
-            <a:r>
-              <a:rPr lang="en-US" sz="2000" dirty="0"/>
-              <a:t>  .</a:t>
+              <a:t>.</a:t>
             </a:r>
             <a:r>
               <a:rPr lang="en-US" sz="2000" dirty="0" err="1"/>

</xml_diff>